<commit_message>
Videos and Changes are uploaded
All Videos and changes are uploaded with ppt and changes are committed
</commit_message>
<xml_diff>
--- a/Machine_Learning/HouseData/PPT and Videos/ProjectPPT.pptx
+++ b/Machine_Learning/HouseData/PPT and Videos/ProjectPPT.pptx
@@ -19,9 +19,9 @@
     <p:sldId id="292" r:id="rId10"/>
     <p:sldId id="300" r:id="rId11"/>
     <p:sldId id="299" r:id="rId12"/>
-    <p:sldId id="304" r:id="rId13"/>
-    <p:sldId id="303" r:id="rId14"/>
-    <p:sldId id="302" r:id="rId15"/>
+    <p:sldId id="303" r:id="rId13"/>
+    <p:sldId id="302" r:id="rId14"/>
+    <p:sldId id="304" r:id="rId15"/>
     <p:sldId id="301" r:id="rId16"/>
     <p:sldId id="311" r:id="rId17"/>
     <p:sldId id="309" r:id="rId18"/>
@@ -2557,7 +2557,7 @@
           </a:ln>
           <a:extLst>
             <a:ext uri="{C572A759-6A51-4108-AA02-DFA0A04FC94B}">
-              <ma14:wrappingTextBoxFlag xmlns:ma14="http://schemas.microsoft.com/office/mac/drawingml/2011/main" xmlns="" val="1"/>
+              <ma14:wrappingTextBoxFlag xmlns="" xmlns:ma14="http://schemas.microsoft.com/office/mac/drawingml/2011/main" val="1"/>
             </a:ext>
           </a:extLst>
         </p:spPr>
@@ -2596,7 +2596,7 @@
           </a:ln>
           <a:extLst>
             <a:ext uri="{C572A759-6A51-4108-AA02-DFA0A04FC94B}">
-              <ma14:wrappingTextBoxFlag xmlns:ma14="http://schemas.microsoft.com/office/mac/drawingml/2011/main" xmlns="" val="1"/>
+              <ma14:wrappingTextBoxFlag xmlns="" xmlns:ma14="http://schemas.microsoft.com/office/mac/drawingml/2011/main" val="1"/>
             </a:ext>
           </a:extLst>
         </p:spPr>
@@ -3784,7 +3784,7 @@
           </a:ln>
           <a:extLst>
             <a:ext uri="{C572A759-6A51-4108-AA02-DFA0A04FC94B}">
-              <ma14:wrappingTextBoxFlag xmlns:ma14="http://schemas.microsoft.com/office/mac/drawingml/2011/main" xmlns="" val="1"/>
+              <ma14:wrappingTextBoxFlag xmlns="" xmlns:ma14="http://schemas.microsoft.com/office/mac/drawingml/2011/main" val="1"/>
             </a:ext>
           </a:extLst>
         </p:spPr>
@@ -4992,7 +4992,7 @@
           </a:ln>
           <a:extLst>
             <a:ext uri="{C572A759-6A51-4108-AA02-DFA0A04FC94B}">
-              <ma14:wrappingTextBoxFlag xmlns:ma14="http://schemas.microsoft.com/office/mac/drawingml/2011/main" xmlns="" val="1"/>
+              <ma14:wrappingTextBoxFlag xmlns="" xmlns:ma14="http://schemas.microsoft.com/office/mac/drawingml/2011/main" val="1"/>
             </a:ext>
           </a:extLst>
         </p:spPr>
@@ -7181,111 +7181,6 @@
       </p:grpSpPr>
       <p:sp>
         <p:nvSpPr>
-          <p:cNvPr id="2" name="Title 1"/>
-          <p:cNvSpPr>
-            <a:spLocks noGrp="1"/>
-          </p:cNvSpPr>
-          <p:nvPr>
-            <p:ph type="title"/>
-          </p:nvPr>
-        </p:nvSpPr>
-        <p:spPr/>
-        <p:txBody>
-          <a:bodyPr>
-            <a:normAutofit/>
-          </a:bodyPr>
-          <a:lstStyle/>
-          <a:p>
-            <a:r>
-              <a:rPr lang="en-IN" sz="4400" dirty="0" smtClean="0">
-                <a:solidFill>
-                  <a:schemeClr val="bg1"/>
-                </a:solidFill>
-              </a:rPr>
-              <a:t>After all the missing data was imputed</a:t>
-            </a:r>
-            <a:endParaRPr lang="en-IN" sz="4400" dirty="0">
-              <a:solidFill>
-                <a:schemeClr val="bg1"/>
-              </a:solidFill>
-            </a:endParaRPr>
-          </a:p>
-        </p:txBody>
-      </p:sp>
-      <p:pic>
-        <p:nvPicPr>
-          <p:cNvPr id="9218" name="Picture 2" descr="C:\Users\Yogesh\Documents\GitHub\DataScienceProjectRepo\Machine_Learning\HouseData\PPT and Videos\MissingDataImputed.png"/>
-          <p:cNvPicPr>
-            <a:picLocks noChangeAspect="1" noChangeArrowheads="1"/>
-          </p:cNvPicPr>
-          <p:nvPr/>
-        </p:nvPicPr>
-        <p:blipFill>
-          <a:blip r:embed="rId2">
-            <a:extLst>
-              <a:ext uri="{28A0092B-C50C-407E-A947-70E740481C1C}">
-                <a14:useLocalDpi xmlns:a14="http://schemas.microsoft.com/office/drawing/2010/main" val="0"/>
-              </a:ext>
-            </a:extLst>
-          </a:blip>
-          <a:srcRect/>
-          <a:stretch>
-            <a:fillRect/>
-          </a:stretch>
-        </p:blipFill>
-        <p:spPr bwMode="auto">
-          <a:xfrm>
-            <a:off x="1092200" y="2514600"/>
-            <a:ext cx="10744200" cy="6609760"/>
-          </a:xfrm>
-          <a:prstGeom prst="rect">
-            <a:avLst/>
-          </a:prstGeom>
-          <a:noFill/>
-          <a:extLst>
-            <a:ext uri="{909E8E84-426E-40DD-AFC4-6F175D3DCCD1}">
-              <a14:hiddenFill xmlns:a14="http://schemas.microsoft.com/office/drawing/2010/main">
-                <a:solidFill>
-                  <a:srgbClr val="FFFFFF"/>
-                </a:solidFill>
-              </a14:hiddenFill>
-            </a:ext>
-          </a:extLst>
-        </p:spPr>
-      </p:pic>
-    </p:spTree>
-    <p:extLst>
-      <p:ext uri="{BB962C8B-B14F-4D97-AF65-F5344CB8AC3E}">
-        <p14:creationId xmlns:p14="http://schemas.microsoft.com/office/powerpoint/2010/main" val="2221794373"/>
-      </p:ext>
-    </p:extLst>
-  </p:cSld>
-  <p:clrMapOvr>
-    <a:masterClrMapping/>
-  </p:clrMapOvr>
-  <p:transition spd="med"/>
-</p:sld>
-</file>
-
-<file path=ppt/slides/slide13.xml><?xml version="1.0" encoding="utf-8"?>
-<p:sld xmlns:a="http://schemas.openxmlformats.org/drawingml/2006/main" xmlns:r="http://schemas.openxmlformats.org/officeDocument/2006/relationships" xmlns:p="http://schemas.openxmlformats.org/presentationml/2006/main">
-  <p:cSld>
-    <p:spTree>
-      <p:nvGrpSpPr>
-        <p:cNvPr id="1" name=""/>
-        <p:cNvGrpSpPr/>
-        <p:nvPr/>
-      </p:nvGrpSpPr>
-      <p:grpSpPr>
-        <a:xfrm>
-          <a:off x="0" y="0"/>
-          <a:ext cx="0" cy="0"/>
-          <a:chOff x="0" y="0"/>
-          <a:chExt cx="0" cy="0"/>
-        </a:xfrm>
-      </p:grpSpPr>
-      <p:sp>
-        <p:nvSpPr>
           <p:cNvPr id="188" name="Marketing Objective"/>
           <p:cNvSpPr txBox="1">
             <a:spLocks noGrp="1"/>
@@ -7348,7 +7243,7 @@
           </a:ln>
           <a:extLst>
             <a:ext uri="{C572A759-6A51-4108-AA02-DFA0A04FC94B}">
-              <ma14:wrappingTextBoxFlag xmlns:ma14="http://schemas.microsoft.com/office/mac/drawingml/2011/main" xmlns="" val="1"/>
+              <ma14:wrappingTextBoxFlag xmlns="" xmlns:ma14="http://schemas.microsoft.com/office/mac/drawingml/2011/main" val="1"/>
             </a:ext>
           </a:extLst>
         </p:spPr>
@@ -7534,7 +7429,7 @@
 </p:sld>
 </file>
 
-<file path=ppt/slides/slide14.xml><?xml version="1.0" encoding="utf-8"?>
+<file path=ppt/slides/slide13.xml><?xml version="1.0" encoding="utf-8"?>
 <p:sld xmlns:a="http://schemas.openxmlformats.org/drawingml/2006/main" xmlns:r="http://schemas.openxmlformats.org/officeDocument/2006/relationships" xmlns:p="http://schemas.openxmlformats.org/presentationml/2006/main">
   <p:cSld>
     <p:spTree>
@@ -7613,7 +7508,7 @@
           </a:ln>
           <a:extLst>
             <a:ext uri="{C572A759-6A51-4108-AA02-DFA0A04FC94B}">
-              <ma14:wrappingTextBoxFlag xmlns:ma14="http://schemas.microsoft.com/office/mac/drawingml/2011/main" xmlns="" val="1"/>
+              <ma14:wrappingTextBoxFlag xmlns="" xmlns:ma14="http://schemas.microsoft.com/office/mac/drawingml/2011/main" val="1"/>
             </a:ext>
           </a:extLst>
         </p:spPr>
@@ -7685,6 +7580,111 @@
     <p:extLst>
       <p:ext uri="{BB962C8B-B14F-4D97-AF65-F5344CB8AC3E}">
         <p14:creationId xmlns:p14="http://schemas.microsoft.com/office/powerpoint/2010/main" val="3010447725"/>
+      </p:ext>
+    </p:extLst>
+  </p:cSld>
+  <p:clrMapOvr>
+    <a:masterClrMapping/>
+  </p:clrMapOvr>
+  <p:transition spd="med"/>
+</p:sld>
+</file>
+
+<file path=ppt/slides/slide14.xml><?xml version="1.0" encoding="utf-8"?>
+<p:sld xmlns:a="http://schemas.openxmlformats.org/drawingml/2006/main" xmlns:r="http://schemas.openxmlformats.org/officeDocument/2006/relationships" xmlns:p="http://schemas.openxmlformats.org/presentationml/2006/main">
+  <p:cSld>
+    <p:spTree>
+      <p:nvGrpSpPr>
+        <p:cNvPr id="1" name=""/>
+        <p:cNvGrpSpPr/>
+        <p:nvPr/>
+      </p:nvGrpSpPr>
+      <p:grpSpPr>
+        <a:xfrm>
+          <a:off x="0" y="0"/>
+          <a:ext cx="0" cy="0"/>
+          <a:chOff x="0" y="0"/>
+          <a:chExt cx="0" cy="0"/>
+        </a:xfrm>
+      </p:grpSpPr>
+      <p:sp>
+        <p:nvSpPr>
+          <p:cNvPr id="2" name="Title 1"/>
+          <p:cNvSpPr>
+            <a:spLocks noGrp="1"/>
+          </p:cNvSpPr>
+          <p:nvPr>
+            <p:ph type="title"/>
+          </p:nvPr>
+        </p:nvSpPr>
+        <p:spPr/>
+        <p:txBody>
+          <a:bodyPr>
+            <a:normAutofit/>
+          </a:bodyPr>
+          <a:lstStyle/>
+          <a:p>
+            <a:r>
+              <a:rPr lang="en-IN" sz="4400" dirty="0" smtClean="0">
+                <a:solidFill>
+                  <a:schemeClr val="bg1"/>
+                </a:solidFill>
+              </a:rPr>
+              <a:t>After all the missing data was imputed</a:t>
+            </a:r>
+            <a:endParaRPr lang="en-IN" sz="4400" dirty="0">
+              <a:solidFill>
+                <a:schemeClr val="bg1"/>
+              </a:solidFill>
+            </a:endParaRPr>
+          </a:p>
+        </p:txBody>
+      </p:sp>
+      <p:pic>
+        <p:nvPicPr>
+          <p:cNvPr id="9218" name="Picture 2" descr="C:\Users\Yogesh\Documents\GitHub\DataScienceProjectRepo\Machine_Learning\HouseData\PPT and Videos\MissingDataImputed.png"/>
+          <p:cNvPicPr>
+            <a:picLocks noChangeAspect="1" noChangeArrowheads="1"/>
+          </p:cNvPicPr>
+          <p:nvPr/>
+        </p:nvPicPr>
+        <p:blipFill>
+          <a:blip r:embed="rId2">
+            <a:extLst>
+              <a:ext uri="{28A0092B-C50C-407E-A947-70E740481C1C}">
+                <a14:useLocalDpi xmlns:a14="http://schemas.microsoft.com/office/drawing/2010/main" val="0"/>
+              </a:ext>
+            </a:extLst>
+          </a:blip>
+          <a:srcRect/>
+          <a:stretch>
+            <a:fillRect/>
+          </a:stretch>
+        </p:blipFill>
+        <p:spPr bwMode="auto">
+          <a:xfrm>
+            <a:off x="1092200" y="2514600"/>
+            <a:ext cx="10744200" cy="6609760"/>
+          </a:xfrm>
+          <a:prstGeom prst="rect">
+            <a:avLst/>
+          </a:prstGeom>
+          <a:noFill/>
+          <a:extLst>
+            <a:ext uri="{909E8E84-426E-40DD-AFC4-6F175D3DCCD1}">
+              <a14:hiddenFill xmlns:a14="http://schemas.microsoft.com/office/drawing/2010/main">
+                <a:solidFill>
+                  <a:srgbClr val="FFFFFF"/>
+                </a:solidFill>
+              </a14:hiddenFill>
+            </a:ext>
+          </a:extLst>
+        </p:spPr>
+      </p:pic>
+    </p:spTree>
+    <p:extLst>
+      <p:ext uri="{BB962C8B-B14F-4D97-AF65-F5344CB8AC3E}">
+        <p14:creationId xmlns:p14="http://schemas.microsoft.com/office/powerpoint/2010/main" val="2221794373"/>
       </p:ext>
     </p:extLst>
   </p:cSld>
@@ -7778,7 +7778,7 @@
           </a:ln>
           <a:extLst>
             <a:ext uri="{C572A759-6A51-4108-AA02-DFA0A04FC94B}">
-              <ma14:wrappingTextBoxFlag xmlns:ma14="http://schemas.microsoft.com/office/mac/drawingml/2011/main" xmlns="" val="1"/>
+              <ma14:wrappingTextBoxFlag xmlns="" xmlns:ma14="http://schemas.microsoft.com/office/mac/drawingml/2011/main" val="1"/>
             </a:ext>
           </a:extLst>
         </p:spPr>
@@ -7826,12 +7826,16 @@
               <a:t> , but same time it has </a:t>
             </a:r>
             <a:r>
-              <a:rPr lang="en-IN" dirty="0" err="1"/>
-              <a:t>multicorrelation</a:t>
-            </a:r>
-            <a:r>
-              <a:rPr lang="en-IN" dirty="0"/>
-              <a:t> with many other parameters, we can include this in set of input parameters and compare the results and </a:t>
+              <a:rPr lang="en-IN" dirty="0" smtClean="0"/>
+              <a:t>M</a:t>
+            </a:r>
+            <a:r>
+              <a:rPr lang="en-IN" dirty="0" smtClean="0"/>
+              <a:t>ulti-correlation </a:t>
+            </a:r>
+            <a:r>
+              <a:rPr lang="en-IN" dirty="0"/>
+              <a:t>with many other parameters, we can include this in set of input parameters and compare the results and </a:t>
             </a:r>
             <a:r>
               <a:rPr lang="en-IN" dirty="0" smtClean="0"/>
@@ -7878,12 +7882,12 @@
               <a:t>parameters with very less correlation and also very less </a:t>
             </a:r>
             <a:r>
-              <a:rPr lang="en-IN" dirty="0" err="1"/>
-              <a:t>Multicorrelation</a:t>
-            </a:r>
-            <a:r>
-              <a:rPr lang="en-IN" dirty="0"/>
-              <a:t> can be considered , but will see if they can do any effect on the Model accuracy.</a:t>
+              <a:rPr lang="en-IN" dirty="0" smtClean="0"/>
+              <a:t>Multi-correlation </a:t>
+            </a:r>
+            <a:r>
+              <a:rPr lang="en-IN" dirty="0"/>
+              <a:t>can be considered , but will see if they can do any effect on the Model accuracy.</a:t>
             </a:r>
           </a:p>
         </p:txBody>
@@ -8792,7 +8796,6 @@
               <a:rPr lang="en-IN" b="1" dirty="0"/>
               <a:t> : Building Price prediction ML model</a:t>
             </a:r>
-            <a:endParaRPr lang="en-IN" b="1" dirty="0"/>
           </a:p>
         </p:txBody>
       </p:sp>
@@ -9167,11 +9170,21 @@
           <a:p>
             <a:r>
               <a:rPr lang="en-IN" dirty="0"/>
-              <a:t>Regression Evaluation Metrics : Random Forest Model(Set B)</a:t>
+              <a:t>Regression Evaluation Metrics : Random Forest Model(Set B</a:t>
+            </a:r>
+            <a:r>
+              <a:rPr lang="en-IN" dirty="0" smtClean="0"/>
+              <a:t>)</a:t>
+            </a:r>
+          </a:p>
+          <a:p>
+            <a:r>
+              <a:rPr lang="en-IN" b="1" dirty="0" smtClean="0"/>
+              <a:t>MAE</a:t>
             </a:r>
             <a:r>
               <a:rPr lang="en-IN" b="1" dirty="0"/>
-              <a:t>MAE: 0.12067498055631946</a:t>
+              <a:t>: 0.12067498055631946</a:t>
             </a:r>
             <a:endParaRPr lang="en-IN" dirty="0"/>
           </a:p>
@@ -10021,7 +10034,7 @@
           </a:ln>
           <a:extLst>
             <a:ext uri="{C572A759-6A51-4108-AA02-DFA0A04FC94B}">
-              <ma14:wrappingTextBoxFlag xmlns:ma14="http://schemas.microsoft.com/office/mac/drawingml/2011/main" xmlns="" val="1"/>
+              <ma14:wrappingTextBoxFlag xmlns="" xmlns:ma14="http://schemas.microsoft.com/office/mac/drawingml/2011/main" val="1"/>
             </a:ext>
           </a:extLst>
         </p:spPr>
@@ -11321,7 +11334,6 @@
               <a:rPr lang="en-IN" dirty="0"/>
               <a:t>'</a:t>
             </a:r>
-            <a:endParaRPr lang="en-IN" dirty="0"/>
           </a:p>
         </p:txBody>
       </p:sp>
@@ -11482,10 +11494,6 @@
             <a:r>
               <a:rPr lang="en-IN" sz="2000" dirty="0"/>
               <a:t>They summarise how close each observed data value is to the mean value. </a:t>
-            </a:r>
-            <a:r>
-              <a:rPr lang="en-IN" sz="2000" dirty="0"/>
-              <a:t/>
             </a:r>
             <a:br>
               <a:rPr lang="en-IN" sz="2000" dirty="0"/>
@@ -12319,7 +12327,7 @@
           </a:ln>
           <a:extLst>
             <a:ext uri="{C572A759-6A51-4108-AA02-DFA0A04FC94B}">
-              <ma14:wrappingTextBoxFlag xmlns:ma14="http://schemas.microsoft.com/office/mac/drawingml/2011/main" xmlns="" val="1"/>
+              <ma14:wrappingTextBoxFlag xmlns="" xmlns:ma14="http://schemas.microsoft.com/office/mac/drawingml/2011/main" val="1"/>
             </a:ext>
           </a:extLst>
         </p:spPr>
@@ -12486,7 +12494,7 @@
           </a:ln>
           <a:extLst>
             <a:ext uri="{C572A759-6A51-4108-AA02-DFA0A04FC94B}">
-              <ma14:wrappingTextBoxFlag xmlns:ma14="http://schemas.microsoft.com/office/mac/drawingml/2011/main" xmlns="" val="1"/>
+              <ma14:wrappingTextBoxFlag xmlns="" xmlns:ma14="http://schemas.microsoft.com/office/mac/drawingml/2011/main" val="1"/>
             </a:ext>
           </a:extLst>
         </p:spPr>

</xml_diff>